<commit_message>
Figures on results section added
</commit_message>
<xml_diff>
--- a/TiltAngleGraph.pptx
+++ b/TiltAngleGraph.pptx
@@ -104,6 +104,11 @@
       </a:defRPr>
     </a:lvl9pPr>
   </p:defaultTextStyle>
+  <p:extLst>
+    <p:ext uri="{EFAFB233-063F-42B5-8137-9DF3F51BA10A}">
+      <p15:sldGuideLst xmlns:p15="http://schemas.microsoft.com/office/powerpoint/2012/main"/>
+    </p:ext>
+  </p:extLst>
 </p:presentation>
 </file>
 
@@ -450,10 +455,7 @@
                 <a:pPr>
                   <a:defRPr sz="3200" b="0" i="0" u="none" strike="noStrike" kern="1200" baseline="0">
                     <a:solidFill>
-                      <a:schemeClr val="tx1">
-                        <a:lumMod val="65000"/>
-                        <a:lumOff val="35000"/>
-                      </a:schemeClr>
+                      <a:schemeClr val="tx1"/>
                     </a:solidFill>
                     <a:latin typeface="Times New Roman" panose="02020603050405020304" pitchFamily="18" charset="0"/>
                     <a:ea typeface="+mn-ea"/>
@@ -482,10 +484,7 @@
               <a:pPr>
                 <a:defRPr sz="3200" b="0" i="0" u="none" strike="noStrike" kern="1200" baseline="0">
                   <a:solidFill>
-                    <a:schemeClr val="tx1">
-                      <a:lumMod val="65000"/>
-                      <a:lumOff val="35000"/>
-                    </a:schemeClr>
+                    <a:schemeClr val="tx1"/>
                   </a:solidFill>
                   <a:latin typeface="Times New Roman" panose="02020603050405020304" pitchFamily="18" charset="0"/>
                   <a:ea typeface="+mn-ea"/>
@@ -520,10 +519,7 @@
             <a:pPr>
               <a:defRPr sz="3200" b="0" i="0" u="none" strike="noStrike" kern="1200" baseline="0">
                 <a:solidFill>
-                  <a:schemeClr val="tx1">
-                    <a:lumMod val="65000"/>
-                    <a:lumOff val="35000"/>
-                  </a:schemeClr>
+                  <a:schemeClr val="tx1"/>
                 </a:solidFill>
                 <a:latin typeface="Times New Roman" panose="02020603050405020304" pitchFamily="18" charset="0"/>
                 <a:ea typeface="+mn-ea"/>
@@ -554,10 +550,7 @@
                 <a:pPr>
                   <a:defRPr sz="3200" b="0" i="0" u="none" strike="noStrike" kern="1200" baseline="0">
                     <a:solidFill>
-                      <a:schemeClr val="tx1">
-                        <a:lumMod val="65000"/>
-                        <a:lumOff val="35000"/>
-                      </a:schemeClr>
+                      <a:schemeClr val="tx1"/>
                     </a:solidFill>
                     <a:latin typeface="Times New Roman" panose="02020603050405020304" pitchFamily="18" charset="0"/>
                     <a:ea typeface="+mn-ea"/>
@@ -594,10 +587,7 @@
               <a:pPr>
                 <a:defRPr sz="3200" b="0" i="0" u="none" strike="noStrike" kern="1200" baseline="0">
                   <a:solidFill>
-                    <a:schemeClr val="tx1">
-                      <a:lumMod val="65000"/>
-                      <a:lumOff val="35000"/>
-                    </a:schemeClr>
+                    <a:schemeClr val="tx1"/>
                   </a:solidFill>
                   <a:latin typeface="Times New Roman" panose="02020603050405020304" pitchFamily="18" charset="0"/>
                   <a:ea typeface="+mn-ea"/>
@@ -632,10 +622,7 @@
             <a:pPr>
               <a:defRPr sz="3200" b="0" i="0" u="none" strike="noStrike" kern="1200" baseline="0">
                 <a:solidFill>
-                  <a:schemeClr val="tx1">
-                    <a:lumMod val="65000"/>
-                    <a:lumOff val="35000"/>
-                  </a:schemeClr>
+                  <a:schemeClr val="tx1"/>
                 </a:solidFill>
                 <a:latin typeface="Times New Roman" panose="02020603050405020304" pitchFamily="18" charset="0"/>
                 <a:ea typeface="+mn-ea"/>
@@ -665,7 +652,7 @@
     <a:noFill/>
     <a:ln>
       <a:solidFill>
-        <a:schemeClr val="bg1"/>
+        <a:schemeClr val="tx1"/>
       </a:solidFill>
     </a:ln>
     <a:effectLst/>
@@ -676,6 +663,9 @@
     <a:p>
       <a:pPr>
         <a:defRPr sz="3200" b="0">
+          <a:solidFill>
+            <a:schemeClr val="tx1"/>
+          </a:solidFill>
           <a:latin typeface="Times New Roman" panose="02020603050405020304" pitchFamily="18" charset="0"/>
           <a:cs typeface="Times New Roman" panose="02020603050405020304" pitchFamily="18" charset="0"/>
         </a:defRPr>
@@ -1394,7 +1384,7 @@
           <a:p>
             <a:fld id="{E42C2835-9795-4CEC-9E81-92C9DC55F073}" type="datetimeFigureOut">
               <a:rPr lang="en-GB" smtClean="0"/>
-              <a:t>20/08/2017</a:t>
+              <a:t>24/08/2017</a:t>
             </a:fld>
             <a:endParaRPr lang="en-GB"/>
           </a:p>
@@ -1594,7 +1584,7 @@
           <a:p>
             <a:fld id="{E42C2835-9795-4CEC-9E81-92C9DC55F073}" type="datetimeFigureOut">
               <a:rPr lang="en-GB" smtClean="0"/>
-              <a:t>20/08/2017</a:t>
+              <a:t>24/08/2017</a:t>
             </a:fld>
             <a:endParaRPr lang="en-GB"/>
           </a:p>
@@ -1804,7 +1794,7 @@
           <a:p>
             <a:fld id="{E42C2835-9795-4CEC-9E81-92C9DC55F073}" type="datetimeFigureOut">
               <a:rPr lang="en-GB" smtClean="0"/>
-              <a:t>20/08/2017</a:t>
+              <a:t>24/08/2017</a:t>
             </a:fld>
             <a:endParaRPr lang="en-GB"/>
           </a:p>
@@ -2004,7 +1994,7 @@
           <a:p>
             <a:fld id="{E42C2835-9795-4CEC-9E81-92C9DC55F073}" type="datetimeFigureOut">
               <a:rPr lang="en-GB" smtClean="0"/>
-              <a:t>20/08/2017</a:t>
+              <a:t>24/08/2017</a:t>
             </a:fld>
             <a:endParaRPr lang="en-GB"/>
           </a:p>
@@ -2280,7 +2270,7 @@
           <a:p>
             <a:fld id="{E42C2835-9795-4CEC-9E81-92C9DC55F073}" type="datetimeFigureOut">
               <a:rPr lang="en-GB" smtClean="0"/>
-              <a:t>20/08/2017</a:t>
+              <a:t>24/08/2017</a:t>
             </a:fld>
             <a:endParaRPr lang="en-GB"/>
           </a:p>
@@ -2548,7 +2538,7 @@
           <a:p>
             <a:fld id="{E42C2835-9795-4CEC-9E81-92C9DC55F073}" type="datetimeFigureOut">
               <a:rPr lang="en-GB" smtClean="0"/>
-              <a:t>20/08/2017</a:t>
+              <a:t>24/08/2017</a:t>
             </a:fld>
             <a:endParaRPr lang="en-GB"/>
           </a:p>
@@ -2963,7 +2953,7 @@
           <a:p>
             <a:fld id="{E42C2835-9795-4CEC-9E81-92C9DC55F073}" type="datetimeFigureOut">
               <a:rPr lang="en-GB" smtClean="0"/>
-              <a:t>20/08/2017</a:t>
+              <a:t>24/08/2017</a:t>
             </a:fld>
             <a:endParaRPr lang="en-GB"/>
           </a:p>
@@ -3105,7 +3095,7 @@
           <a:p>
             <a:fld id="{E42C2835-9795-4CEC-9E81-92C9DC55F073}" type="datetimeFigureOut">
               <a:rPr lang="en-GB" smtClean="0"/>
-              <a:t>20/08/2017</a:t>
+              <a:t>24/08/2017</a:t>
             </a:fld>
             <a:endParaRPr lang="en-GB"/>
           </a:p>
@@ -3218,7 +3208,7 @@
           <a:p>
             <a:fld id="{E42C2835-9795-4CEC-9E81-92C9DC55F073}" type="datetimeFigureOut">
               <a:rPr lang="en-GB" smtClean="0"/>
-              <a:t>20/08/2017</a:t>
+              <a:t>24/08/2017</a:t>
             </a:fld>
             <a:endParaRPr lang="en-GB"/>
           </a:p>
@@ -3531,7 +3521,7 @@
           <a:p>
             <a:fld id="{E42C2835-9795-4CEC-9E81-92C9DC55F073}" type="datetimeFigureOut">
               <a:rPr lang="en-GB" smtClean="0"/>
-              <a:t>20/08/2017</a:t>
+              <a:t>24/08/2017</a:t>
             </a:fld>
             <a:endParaRPr lang="en-GB"/>
           </a:p>
@@ -3820,7 +3810,7 @@
           <a:p>
             <a:fld id="{E42C2835-9795-4CEC-9E81-92C9DC55F073}" type="datetimeFigureOut">
               <a:rPr lang="en-GB" smtClean="0"/>
-              <a:t>20/08/2017</a:t>
+              <a:t>24/08/2017</a:t>
             </a:fld>
             <a:endParaRPr lang="en-GB"/>
           </a:p>
@@ -4063,7 +4053,7 @@
           <a:p>
             <a:fld id="{E42C2835-9795-4CEC-9E81-92C9DC55F073}" type="datetimeFigureOut">
               <a:rPr lang="en-GB" smtClean="0"/>
-              <a:t>20/08/2017</a:t>
+              <a:t>24/08/2017</a:t>
             </a:fld>
             <a:endParaRPr lang="en-GB"/>
           </a:p>
@@ -4495,7 +4485,7 @@
           <p:nvPr>
             <p:extLst>
               <p:ext uri="{D42A27DB-BD31-4B8C-83A1-F6EECF244321}">
-                <p14:modId xmlns:p14="http://schemas.microsoft.com/office/powerpoint/2010/main" val="2641332274"/>
+                <p14:modId xmlns:p14="http://schemas.microsoft.com/office/powerpoint/2010/main" val="3429169624"/>
               </p:ext>
             </p:extLst>
           </p:nvPr>

</xml_diff>